<commit_message>
Added Group table to tennis_app database
</commit_message>
<xml_diff>
--- a/docs/powerpt_mockup.pptx
+++ b/docs/powerpt_mockup.pptx
@@ -3241,7 +3241,7 @@
         </p:nvSpPr>
         <p:spPr>
           <a:xfrm>
-            <a:off x="1371600" y="3323232"/>
+            <a:off x="1371600" y="3616296"/>
             <a:ext cx="6400800" cy="1309255"/>
           </a:xfrm>
         </p:spPr>
@@ -3439,7 +3439,7 @@
       </p:sp>
       <p:grpSp>
         <p:nvGrpSpPr>
-          <p:cNvPr id="9" name="Group 8"/>
+          <p:cNvPr id="11" name="Group 10"/>
           <p:cNvGrpSpPr/>
           <p:nvPr/>
         </p:nvGrpSpPr>
@@ -3447,95 +3447,46 @@
           <a:xfrm>
             <a:off x="2069220" y="2616977"/>
             <a:ext cx="5002391" cy="830997"/>
-            <a:chOff x="2240193" y="3447974"/>
+            <a:chOff x="2069220" y="2616977"/>
             <a:chExt cx="5002391" cy="830997"/>
           </a:xfrm>
         </p:grpSpPr>
-        <p:grpSp>
-          <p:nvGrpSpPr>
-            <p:cNvPr id="8" name="Group 7"/>
-            <p:cNvGrpSpPr/>
+        <p:sp>
+          <p:nvSpPr>
+            <p:cNvPr id="5" name="TextBox 4"/>
+            <p:cNvSpPr txBox="1"/>
             <p:nvPr/>
-          </p:nvGrpSpPr>
-          <p:grpSpPr>
+          </p:nvSpPr>
+          <p:spPr>
             <a:xfrm>
-              <a:off x="2240193" y="3447974"/>
+              <a:off x="2069220" y="2616977"/>
               <a:ext cx="5002391" cy="830997"/>
-              <a:chOff x="2203535" y="3447974"/>
-              <a:chExt cx="5002391" cy="830997"/>
             </a:xfrm>
-          </p:grpSpPr>
-          <p:sp>
-            <p:nvSpPr>
-              <p:cNvPr id="5" name="TextBox 4"/>
-              <p:cNvSpPr txBox="1"/>
-              <p:nvPr/>
-            </p:nvSpPr>
-            <p:spPr>
-              <a:xfrm>
-                <a:off x="2203535" y="3447974"/>
-                <a:ext cx="5002391" cy="830997"/>
-              </a:xfrm>
-              <a:prstGeom prst="rect">
-                <a:avLst/>
-              </a:prstGeom>
+            <a:prstGeom prst="rect">
+              <a:avLst/>
+            </a:prstGeom>
+            <a:noFill/>
+            <a:ln>
               <a:noFill/>
-              <a:ln>
-                <a:noFill/>
-              </a:ln>
-              <a:scene3d>
-                <a:camera prst="orthographicFront"/>
-                <a:lightRig rig="flat" dir="tl">
-                  <a:rot lat="0" lon="0" rev="6600000"/>
-                </a:lightRig>
-              </a:scene3d>
-              <a:sp3d>
-                <a:bevelT/>
-              </a:sp3d>
-            </p:spPr>
-            <p:txBody>
-              <a:bodyPr wrap="none" rtlCol="0">
-                <a:spAutoFit/>
-              </a:bodyPr>
-              <a:lstStyle/>
-              <a:p>
-                <a:r>
-                  <a:rPr lang="en-US" sz="4800" dirty="0" smtClean="0">
-                    <a:ln w="1905"/>
-                    <a:solidFill>
-                      <a:srgbClr val="0000FF"/>
-                    </a:solidFill>
-                    <a:effectLst>
-                      <a:innerShdw blurRad="69850" dist="43180" dir="5400000">
-                        <a:srgbClr val="000000">
-                          <a:alpha val="65000"/>
-                        </a:srgbClr>
-                      </a:innerShdw>
-                    </a:effectLst>
-                    <a:latin typeface="Menlo Regular"/>
-                    <a:cs typeface="Menlo Regular"/>
-                  </a:rPr>
-                  <a:t>Tennis  Gr </a:t>
-                </a:r>
-                <a:r>
-                  <a:rPr lang="en-US" sz="4800" dirty="0" smtClean="0">
-                    <a:ln w="1905"/>
-                    <a:solidFill>
-                      <a:srgbClr val="0000FF"/>
-                    </a:solidFill>
-                    <a:effectLst>
-                      <a:innerShdw blurRad="69850" dist="43180" dir="5400000">
-                        <a:srgbClr val="000000">
-                          <a:alpha val="65000"/>
-                        </a:srgbClr>
-                      </a:innerShdw>
-                    </a:effectLst>
-                    <a:latin typeface="Menlo Regular"/>
-                    <a:cs typeface="Menlo Regular"/>
-                  </a:rPr>
-                  <a:t>up</a:t>
-                </a:r>
-                <a:endParaRPr lang="en-US" sz="4800" dirty="0">
+            </a:ln>
+            <a:scene3d>
+              <a:camera prst="orthographicFront"/>
+              <a:lightRig rig="flat" dir="tl">
+                <a:rot lat="0" lon="0" rev="6600000"/>
+              </a:lightRig>
+            </a:scene3d>
+            <a:sp3d>
+              <a:bevelT/>
+            </a:sp3d>
+          </p:spPr>
+          <p:txBody>
+            <a:bodyPr wrap="none" rtlCol="0">
+              <a:spAutoFit/>
+            </a:bodyPr>
+            <a:lstStyle/>
+            <a:p>
+              <a:r>
+                <a:rPr lang="en-US" sz="4800" dirty="0" smtClean="0">
                   <a:ln w="1905"/>
                   <a:solidFill>
                     <a:srgbClr val="0000FF"/>
@@ -3549,41 +3500,75 @@
                   </a:effectLst>
                   <a:latin typeface="Menlo Regular"/>
                   <a:cs typeface="Menlo Regular"/>
-                </a:endParaRPr>
-              </a:p>
-            </p:txBody>
-          </p:sp>
-          <p:pic>
-            <p:nvPicPr>
-              <p:cNvPr id="6" name="Picture 5" descr="tennisball_blue.png"/>
-              <p:cNvPicPr>
-                <a:picLocks noChangeAspect="1"/>
-              </p:cNvPicPr>
-              <p:nvPr/>
-            </p:nvPicPr>
-            <p:blipFill>
-              <a:blip r:embed="rId2">
-                <a:extLst>
-                  <a:ext uri="{28A0092B-C50C-407E-A947-70E740481C1C}">
-                    <a14:useLocalDpi xmlns:a14="http://schemas.microsoft.com/office/drawing/2010/main" val="0"/>
-                  </a:ext>
-                </a:extLst>
-              </a:blip>
-              <a:stretch>
-                <a:fillRect/>
-              </a:stretch>
-            </p:blipFill>
-            <p:spPr>
-              <a:xfrm flipV="1">
-                <a:off x="5926104" y="3737959"/>
-                <a:ext cx="416270" cy="416270"/>
-              </a:xfrm>
-              <a:prstGeom prst="rect">
-                <a:avLst/>
-              </a:prstGeom>
-            </p:spPr>
-          </p:pic>
-        </p:grpSp>
+                </a:rPr>
+                <a:t>Tennis  Gr </a:t>
+              </a:r>
+              <a:r>
+                <a:rPr lang="en-US" sz="4800" dirty="0" smtClean="0">
+                  <a:ln w="1905"/>
+                  <a:solidFill>
+                    <a:srgbClr val="0000FF"/>
+                  </a:solidFill>
+                  <a:effectLst>
+                    <a:innerShdw blurRad="69850" dist="43180" dir="5400000">
+                      <a:srgbClr val="000000">
+                        <a:alpha val="65000"/>
+                      </a:srgbClr>
+                    </a:innerShdw>
+                  </a:effectLst>
+                  <a:latin typeface="Menlo Regular"/>
+                  <a:cs typeface="Menlo Regular"/>
+                </a:rPr>
+                <a:t>up</a:t>
+              </a:r>
+              <a:endParaRPr lang="en-US" sz="4800" dirty="0">
+                <a:ln w="1905"/>
+                <a:solidFill>
+                  <a:srgbClr val="0000FF"/>
+                </a:solidFill>
+                <a:effectLst>
+                  <a:innerShdw blurRad="69850" dist="43180" dir="5400000">
+                    <a:srgbClr val="000000">
+                      <a:alpha val="65000"/>
+                    </a:srgbClr>
+                  </a:innerShdw>
+                </a:effectLst>
+                <a:latin typeface="Menlo Regular"/>
+                <a:cs typeface="Menlo Regular"/>
+              </a:endParaRPr>
+            </a:p>
+          </p:txBody>
+        </p:sp>
+        <p:pic>
+          <p:nvPicPr>
+            <p:cNvPr id="6" name="Picture 5" descr="tennisball_blue.png"/>
+            <p:cNvPicPr>
+              <a:picLocks noChangeAspect="1"/>
+            </p:cNvPicPr>
+            <p:nvPr/>
+          </p:nvPicPr>
+          <p:blipFill>
+            <a:blip r:embed="rId2">
+              <a:extLst>
+                <a:ext uri="{28A0092B-C50C-407E-A947-70E740481C1C}">
+                  <a14:useLocalDpi xmlns:a14="http://schemas.microsoft.com/office/drawing/2010/main" val="0"/>
+                </a:ext>
+              </a:extLst>
+            </a:blip>
+            <a:stretch>
+              <a:fillRect/>
+            </a:stretch>
+          </p:blipFill>
+          <p:spPr>
+            <a:xfrm flipV="1">
+              <a:off x="5791789" y="2906962"/>
+              <a:ext cx="416270" cy="416270"/>
+            </a:xfrm>
+            <a:prstGeom prst="rect">
+              <a:avLst/>
+            </a:prstGeom>
+          </p:spPr>
+        </p:pic>
         <p:pic>
           <p:nvPicPr>
             <p:cNvPr id="7" name="Picture 6" descr="t_racket.png"/>
@@ -3606,7 +3591,7 @@
           </p:blipFill>
           <p:spPr>
             <a:xfrm>
-              <a:off x="4461323" y="3447974"/>
+              <a:off x="4290350" y="2616977"/>
               <a:ext cx="851054" cy="775405"/>
             </a:xfrm>
             <a:prstGeom prst="rect">
@@ -18652,7 +18637,7 @@
                   </a:innerShdw>
                 </a:effectLst>
               </a:rPr>
-              <a:t>Address Book</a:t>
+              <a:t>Group Roster</a:t>
             </a:r>
             <a:endParaRPr lang="en-US" b="1" spc="50" dirty="0">
               <a:ln w="13500">
@@ -18688,8 +18673,8 @@
         </p:nvSpPr>
         <p:spPr>
           <a:xfrm>
-            <a:off x="782766" y="1135623"/>
-            <a:ext cx="6992508" cy="5067562"/>
+            <a:off x="955162" y="1280046"/>
+            <a:ext cx="7073599" cy="4581230"/>
           </a:xfrm>
           <a:prstGeom prst="rect">
             <a:avLst/>
@@ -18740,8 +18725,8 @@
         </p:blipFill>
         <p:spPr>
           <a:xfrm>
-            <a:off x="899127" y="1217322"/>
-            <a:ext cx="6754023" cy="4998073"/>
+            <a:off x="1065645" y="1157672"/>
+            <a:ext cx="6832347" cy="4715815"/>
           </a:xfrm>
           <a:prstGeom prst="rect">
             <a:avLst/>
@@ -18770,8 +18755,8 @@
         </p:blipFill>
         <p:spPr>
           <a:xfrm>
-            <a:off x="724387" y="952458"/>
-            <a:ext cx="7087523" cy="5471239"/>
+            <a:off x="899127" y="919529"/>
+            <a:ext cx="7169715" cy="5162260"/>
           </a:xfrm>
           <a:prstGeom prst="rect">
             <a:avLst/>
@@ -18780,81 +18765,79 @@
       </p:pic>
       <p:grpSp>
         <p:nvGrpSpPr>
-          <p:cNvPr id="7" name="Group 6"/>
+          <p:cNvPr id="22" name="Group 21"/>
           <p:cNvGrpSpPr/>
           <p:nvPr/>
         </p:nvGrpSpPr>
         <p:grpSpPr>
           <a:xfrm>
-            <a:off x="6253017" y="2364893"/>
+            <a:off x="6214113" y="2276672"/>
             <a:ext cx="2433783" cy="4410374"/>
-            <a:chOff x="8894409" y="855309"/>
+            <a:chOff x="9242771" y="134321"/>
             <a:chExt cx="2433783" cy="4410374"/>
           </a:xfrm>
         </p:grpSpPr>
+        <p:sp>
+          <p:nvSpPr>
+            <p:cNvPr id="13" name="Rectangle 12"/>
+            <p:cNvSpPr/>
+            <p:nvPr/>
+          </p:nvSpPr>
+          <p:spPr>
+            <a:xfrm>
+              <a:off x="9514966" y="705358"/>
+              <a:ext cx="1861307" cy="3470802"/>
+            </a:xfrm>
+            <a:prstGeom prst="rect">
+              <a:avLst/>
+            </a:prstGeom>
+            <a:solidFill>
+              <a:srgbClr val="FFFFFF"/>
+            </a:solidFill>
+            <a:ln>
+              <a:noFill/>
+            </a:ln>
+          </p:spPr>
+          <p:style>
+            <a:lnRef idx="1">
+              <a:schemeClr val="accent1"/>
+            </a:lnRef>
+            <a:fillRef idx="3">
+              <a:schemeClr val="accent1"/>
+            </a:fillRef>
+            <a:effectRef idx="2">
+              <a:schemeClr val="accent1"/>
+            </a:effectRef>
+            <a:fontRef idx="minor">
+              <a:schemeClr val="lt1"/>
+            </a:fontRef>
+          </p:style>
+          <p:txBody>
+            <a:bodyPr rtlCol="0" anchor="ctr"/>
+            <a:lstStyle/>
+            <a:p>
+              <a:pPr algn="ctr"/>
+              <a:endParaRPr lang="en-US"/>
+            </a:p>
+          </p:txBody>
+        </p:sp>
         <p:pic>
           <p:nvPicPr>
-            <p:cNvPr id="16" name="Picture 15"/>
+            <p:cNvPr id="8" name="Picture 7"/>
             <p:cNvPicPr>
               <a:picLocks noChangeAspect="1"/>
             </p:cNvPicPr>
             <p:nvPr/>
           </p:nvPicPr>
           <p:blipFill rotWithShape="1">
-            <a:blip r:embed="rId2"/>
-            <a:srcRect t="12099" r="64827" b="25943"/>
+            <a:blip r:embed="rId4"/>
+            <a:srcRect b="16357"/>
             <a:stretch/>
           </p:blipFill>
           <p:spPr>
             <a:xfrm>
-              <a:off x="9144000" y="2063658"/>
-              <a:ext cx="1901584" cy="2600942"/>
-            </a:xfrm>
-            <a:prstGeom prst="rect">
-              <a:avLst/>
-            </a:prstGeom>
-          </p:spPr>
-        </p:pic>
-        <p:pic>
-          <p:nvPicPr>
-            <p:cNvPr id="17" name="Picture 16"/>
-            <p:cNvPicPr>
-              <a:picLocks noChangeAspect="1"/>
-            </p:cNvPicPr>
-            <p:nvPr/>
-          </p:nvPicPr>
-          <p:blipFill rotWithShape="1">
-            <a:blip r:embed="rId2"/>
-            <a:srcRect t="793" r="72719" b="86828"/>
-            <a:stretch/>
-          </p:blipFill>
-          <p:spPr>
-            <a:xfrm>
-              <a:off x="9144000" y="1568400"/>
-              <a:ext cx="1474897" cy="495258"/>
-            </a:xfrm>
-            <a:prstGeom prst="rect">
-              <a:avLst/>
-            </a:prstGeom>
-          </p:spPr>
-        </p:pic>
-        <p:pic>
-          <p:nvPicPr>
-            <p:cNvPr id="19" name="Picture 18"/>
-            <p:cNvPicPr>
-              <a:picLocks noChangeAspect="1"/>
-            </p:cNvPicPr>
-            <p:nvPr/>
-          </p:nvPicPr>
-          <p:blipFill rotWithShape="1">
-            <a:blip r:embed="rId2"/>
-            <a:srcRect t="793" r="96664" b="86828"/>
-            <a:stretch/>
-          </p:blipFill>
-          <p:spPr>
-            <a:xfrm>
-              <a:off x="10606685" y="1568400"/>
-              <a:ext cx="438899" cy="495258"/>
+              <a:off x="9514966" y="864101"/>
+              <a:ext cx="1861307" cy="3080050"/>
             </a:xfrm>
             <a:prstGeom prst="rect">
               <a:avLst/>
@@ -18870,7 +18853,7 @@
             <p:nvPr/>
           </p:nvPicPr>
           <p:blipFill>
-            <a:blip r:embed="rId4">
+            <a:blip r:embed="rId5">
               <a:extLst>
                 <a:ext uri="{28A0092B-C50C-407E-A947-70E740481C1C}">
                   <a14:useLocalDpi xmlns:a14="http://schemas.microsoft.com/office/drawing/2010/main" val="0"/>
@@ -18883,7 +18866,7 @@
           </p:blipFill>
           <p:spPr>
             <a:xfrm>
-              <a:off x="8894409" y="855309"/>
+              <a:off x="9242771" y="134321"/>
               <a:ext cx="2433783" cy="4410374"/>
             </a:xfrm>
             <a:prstGeom prst="rect">
@@ -18891,111 +18874,6 @@
             </a:prstGeom>
           </p:spPr>
         </p:pic>
-        <p:grpSp>
-          <p:nvGrpSpPr>
-            <p:cNvPr id="6" name="Group 5"/>
-            <p:cNvGrpSpPr/>
-            <p:nvPr/>
-          </p:nvGrpSpPr>
-          <p:grpSpPr>
-            <a:xfrm>
-              <a:off x="10710234" y="1617783"/>
-              <a:ext cx="183186" cy="131441"/>
-              <a:chOff x="-1709730" y="573917"/>
-              <a:chExt cx="183186" cy="131441"/>
-            </a:xfrm>
-          </p:grpSpPr>
-          <p:cxnSp>
-            <p:nvCxnSpPr>
-              <p:cNvPr id="5" name="Straight Connector 4"/>
-              <p:cNvCxnSpPr/>
-              <p:nvPr/>
-            </p:nvCxnSpPr>
-            <p:spPr>
-              <a:xfrm>
-                <a:off x="-1709730" y="573917"/>
-                <a:ext cx="183186" cy="0"/>
-              </a:xfrm>
-              <a:prstGeom prst="line">
-                <a:avLst/>
-              </a:prstGeom>
-            </p:spPr>
-            <p:style>
-              <a:lnRef idx="2">
-                <a:schemeClr val="dk1"/>
-              </a:lnRef>
-              <a:fillRef idx="0">
-                <a:schemeClr val="dk1"/>
-              </a:fillRef>
-              <a:effectRef idx="1">
-                <a:schemeClr val="dk1"/>
-              </a:effectRef>
-              <a:fontRef idx="minor">
-                <a:schemeClr val="tx1"/>
-              </a:fontRef>
-            </p:style>
-          </p:cxnSp>
-          <p:cxnSp>
-            <p:nvCxnSpPr>
-              <p:cNvPr id="20" name="Straight Connector 19"/>
-              <p:cNvCxnSpPr/>
-              <p:nvPr/>
-            </p:nvCxnSpPr>
-            <p:spPr>
-              <a:xfrm>
-                <a:off x="-1709730" y="637960"/>
-                <a:ext cx="183186" cy="0"/>
-              </a:xfrm>
-              <a:prstGeom prst="line">
-                <a:avLst/>
-              </a:prstGeom>
-            </p:spPr>
-            <p:style>
-              <a:lnRef idx="2">
-                <a:schemeClr val="dk1"/>
-              </a:lnRef>
-              <a:fillRef idx="0">
-                <a:schemeClr val="dk1"/>
-              </a:fillRef>
-              <a:effectRef idx="1">
-                <a:schemeClr val="dk1"/>
-              </a:effectRef>
-              <a:fontRef idx="minor">
-                <a:schemeClr val="tx1"/>
-              </a:fontRef>
-            </p:style>
-          </p:cxnSp>
-          <p:cxnSp>
-            <p:nvCxnSpPr>
-              <p:cNvPr id="21" name="Straight Connector 20"/>
-              <p:cNvCxnSpPr/>
-              <p:nvPr/>
-            </p:nvCxnSpPr>
-            <p:spPr>
-              <a:xfrm>
-                <a:off x="-1709730" y="705358"/>
-                <a:ext cx="183186" cy="0"/>
-              </a:xfrm>
-              <a:prstGeom prst="line">
-                <a:avLst/>
-              </a:prstGeom>
-            </p:spPr>
-            <p:style>
-              <a:lnRef idx="2">
-                <a:schemeClr val="dk1"/>
-              </a:lnRef>
-              <a:fillRef idx="0">
-                <a:schemeClr val="dk1"/>
-              </a:fillRef>
-              <a:effectRef idx="1">
-                <a:schemeClr val="dk1"/>
-              </a:effectRef>
-              <a:fontRef idx="minor">
-                <a:schemeClr val="tx1"/>
-              </a:fontRef>
-            </p:style>
-          </p:cxnSp>
-        </p:grpSp>
       </p:grpSp>
     </p:spTree>
     <p:extLst>
@@ -19076,8 +18954,8 @@
         </p:nvSpPr>
         <p:spPr>
           <a:xfrm>
-            <a:off x="5154749" y="2594842"/>
-            <a:ext cx="1497624" cy="317500"/>
+            <a:off x="5493833" y="2627504"/>
+            <a:ext cx="1494674" cy="333682"/>
           </a:xfrm>
           <a:prstGeom prst="rect">
             <a:avLst/>
@@ -19195,8 +19073,8 @@
         </p:nvGrpSpPr>
         <p:grpSpPr>
           <a:xfrm>
-            <a:off x="732032" y="1196677"/>
-            <a:ext cx="7244915" cy="4791573"/>
+            <a:off x="940350" y="1001303"/>
+            <a:ext cx="7230647" cy="5035792"/>
             <a:chOff x="-2540879" y="0"/>
             <a:chExt cx="7244915" cy="4791573"/>
           </a:xfrm>
@@ -19264,9 +19142,9 @@
         </p:nvGrpSpPr>
         <p:grpSpPr>
           <a:xfrm>
-            <a:off x="6332256" y="2594842"/>
+            <a:off x="6613132" y="2484943"/>
             <a:ext cx="2200656" cy="4126992"/>
-            <a:chOff x="6774786" y="506924"/>
+            <a:chOff x="6774786" y="519135"/>
             <a:chExt cx="2200656" cy="4126992"/>
           </a:xfrm>
         </p:grpSpPr>
@@ -19315,7 +19193,7 @@
           </p:blipFill>
           <p:spPr>
             <a:xfrm>
-              <a:off x="6774786" y="506924"/>
+              <a:off x="6774786" y="519135"/>
               <a:ext cx="2200656" cy="4126992"/>
             </a:xfrm>
             <a:prstGeom prst="rect">
@@ -19604,115 +19482,85 @@
           </a:p>
         </p:txBody>
       </p:sp>
-      <p:sp>
-        <p:nvSpPr>
-          <p:cNvPr id="4" name="Rectangle 3"/>
-          <p:cNvSpPr/>
-          <p:nvPr/>
-        </p:nvSpPr>
-        <p:spPr>
-          <a:xfrm>
-            <a:off x="870505" y="1185110"/>
-            <a:ext cx="6610501" cy="4577770"/>
-          </a:xfrm>
-          <a:prstGeom prst="rect">
-            <a:avLst/>
-          </a:prstGeom>
-          <a:solidFill>
-            <a:schemeClr val="bg1"/>
-          </a:solidFill>
-          <a:ln>
-            <a:noFill/>
-          </a:ln>
-          <a:effectLst/>
-        </p:spPr>
-        <p:style>
-          <a:lnRef idx="1">
-            <a:schemeClr val="accent1"/>
-          </a:lnRef>
-          <a:fillRef idx="3">
-            <a:schemeClr val="accent1"/>
-          </a:fillRef>
-          <a:effectRef idx="2">
-            <a:schemeClr val="accent1"/>
-          </a:effectRef>
-          <a:fontRef idx="minor">
-            <a:schemeClr val="lt1"/>
-          </a:fontRef>
-        </p:style>
-        <p:txBody>
-          <a:bodyPr rtlCol="0" anchor="ctr"/>
-          <a:lstStyle/>
-          <a:p>
-            <a:pPr algn="ctr"/>
-            <a:endParaRPr lang="en-US"/>
-          </a:p>
-        </p:txBody>
-      </p:sp>
-      <p:pic>
-        <p:nvPicPr>
-          <p:cNvPr id="17" name="Picture 16"/>
-          <p:cNvPicPr>
-            <a:picLocks noChangeAspect="1"/>
-          </p:cNvPicPr>
-          <p:nvPr/>
-        </p:nvPicPr>
-        <p:blipFill rotWithShape="1">
-          <a:blip r:embed="rId2"/>
-          <a:srcRect l="13101" r="8966"/>
-          <a:stretch/>
-        </p:blipFill>
-        <p:spPr>
-          <a:xfrm>
-            <a:off x="911673" y="1185110"/>
-            <a:ext cx="6523182" cy="4577770"/>
-          </a:xfrm>
-          <a:prstGeom prst="rect">
-            <a:avLst/>
-          </a:prstGeom>
-        </p:spPr>
-      </p:pic>
-      <p:pic>
-        <p:nvPicPr>
-          <p:cNvPr id="7" name="Picture 6" descr="monitor.png"/>
-          <p:cNvPicPr>
-            <a:picLocks noChangeAspect="1"/>
-          </p:cNvPicPr>
-          <p:nvPr/>
-        </p:nvPicPr>
-        <p:blipFill>
-          <a:blip r:embed="rId3">
-            <a:extLst>
-              <a:ext uri="{28A0092B-C50C-407E-A947-70E740481C1C}">
-                <a14:useLocalDpi xmlns:a14="http://schemas.microsoft.com/office/drawing/2010/main" val="0"/>
-              </a:ext>
-            </a:extLst>
-          </a:blip>
-          <a:stretch>
-            <a:fillRect/>
-          </a:stretch>
-        </p:blipFill>
-        <p:spPr>
-          <a:xfrm>
-            <a:off x="727340" y="947997"/>
-            <a:ext cx="6897255" cy="5011158"/>
-          </a:xfrm>
-          <a:prstGeom prst="rect">
-            <a:avLst/>
-          </a:prstGeom>
-        </p:spPr>
-      </p:pic>
       <p:grpSp>
         <p:nvGrpSpPr>
-          <p:cNvPr id="13" name="Group 12"/>
+          <p:cNvPr id="8" name="Group 7"/>
           <p:cNvGrpSpPr/>
           <p:nvPr/>
         </p:nvGrpSpPr>
         <p:grpSpPr>
           <a:xfrm>
-            <a:off x="6299327" y="2216829"/>
+            <a:off x="856909" y="1090344"/>
+            <a:ext cx="6897255" cy="5011158"/>
+            <a:chOff x="-1951932" y="357684"/>
+            <a:chExt cx="6897255" cy="5011158"/>
+          </a:xfrm>
+        </p:grpSpPr>
+        <p:pic>
+          <p:nvPicPr>
+            <p:cNvPr id="5" name="Picture 4"/>
+            <p:cNvPicPr>
+              <a:picLocks noChangeAspect="1"/>
+            </p:cNvPicPr>
+            <p:nvPr/>
+          </p:nvPicPr>
+          <p:blipFill rotWithShape="1">
+            <a:blip r:embed="rId2"/>
+            <a:srcRect l="10464" r="10345"/>
+            <a:stretch/>
+          </p:blipFill>
+          <p:spPr>
+            <a:xfrm>
+              <a:off x="-1783004" y="595058"/>
+              <a:ext cx="6631309" cy="4521350"/>
+            </a:xfrm>
+            <a:prstGeom prst="rect">
+              <a:avLst/>
+            </a:prstGeom>
+          </p:spPr>
+        </p:pic>
+        <p:pic>
+          <p:nvPicPr>
+            <p:cNvPr id="7" name="Picture 6" descr="monitor.png"/>
+            <p:cNvPicPr>
+              <a:picLocks noChangeAspect="1"/>
+            </p:cNvPicPr>
+            <p:nvPr/>
+          </p:nvPicPr>
+          <p:blipFill>
+            <a:blip r:embed="rId3">
+              <a:extLst>
+                <a:ext uri="{28A0092B-C50C-407E-A947-70E740481C1C}">
+                  <a14:useLocalDpi xmlns:a14="http://schemas.microsoft.com/office/drawing/2010/main" val="0"/>
+                </a:ext>
+              </a:extLst>
+            </a:blip>
+            <a:stretch>
+              <a:fillRect/>
+            </a:stretch>
+          </p:blipFill>
+          <p:spPr>
+            <a:xfrm>
+              <a:off x="-1951932" y="357684"/>
+              <a:ext cx="6897255" cy="5011158"/>
+            </a:xfrm>
+            <a:prstGeom prst="rect">
+              <a:avLst/>
+            </a:prstGeom>
+          </p:spPr>
+        </p:pic>
+      </p:grpSp>
+      <p:grpSp>
+        <p:nvGrpSpPr>
+          <p:cNvPr id="10" name="Group 9"/>
+          <p:cNvGrpSpPr/>
+          <p:nvPr/>
+        </p:nvGrpSpPr>
+        <p:grpSpPr>
+          <a:xfrm>
+            <a:off x="6465934" y="2319877"/>
             <a:ext cx="2382424" cy="4377339"/>
-            <a:chOff x="6195850" y="2446025"/>
+            <a:chOff x="7965000" y="2409131"/>
             <a:chExt cx="2382424" cy="4377339"/>
           </a:xfrm>
         </p:grpSpPr>
@@ -19724,7 +19572,7 @@
           </p:nvSpPr>
           <p:spPr>
             <a:xfrm>
-              <a:off x="6500090" y="3000420"/>
+              <a:off x="8255000" y="3105301"/>
               <a:ext cx="1778000" cy="3430397"/>
             </a:xfrm>
             <a:prstGeom prst="rect">
@@ -19763,21 +19611,22 @@
         </p:sp>
         <p:pic>
           <p:nvPicPr>
-            <p:cNvPr id="12" name="Picture 11"/>
+            <p:cNvPr id="9" name="Picture 8"/>
             <p:cNvPicPr>
               <a:picLocks noChangeAspect="1"/>
             </p:cNvPicPr>
             <p:nvPr/>
           </p:nvPicPr>
-          <p:blipFill rotWithShape="1">
+          <p:blipFill>
             <a:blip r:embed="rId4"/>
-            <a:srcRect b="6751"/>
-            <a:stretch/>
+            <a:stretch>
+              <a:fillRect/>
+            </a:stretch>
           </p:blipFill>
           <p:spPr>
             <a:xfrm>
-              <a:off x="6488545" y="3177936"/>
-              <a:ext cx="1778000" cy="3218246"/>
+              <a:off x="8255001" y="3129723"/>
+              <a:ext cx="1777999" cy="3471541"/>
             </a:xfrm>
             <a:prstGeom prst="rect">
               <a:avLst/>
@@ -19806,7 +19655,7 @@
           </p:blipFill>
           <p:spPr>
             <a:xfrm>
-              <a:off x="6195850" y="2446025"/>
+              <a:off x="7965000" y="2409131"/>
               <a:ext cx="2382424" cy="4377339"/>
             </a:xfrm>
             <a:prstGeom prst="rect">

</xml_diff>